<commit_message>
updated plot font sizes and cartoons
</commit_message>
<xml_diff>
--- a/paper/figures/n_reuse_sweep_LEO_kerosene_annotated.pptx
+++ b/paper/figures/n_reuse_sweep_LEO_kerosene_annotated.pptx
@@ -6,6 +6,7 @@
   </p:sldMasterIdLst>
   <p:sldIdLst>
     <p:sldId id="257" r:id="rId2"/>
+    <p:sldId id="258" r:id="rId3"/>
   </p:sldIdLst>
   <p:sldSz cx="9144000" cy="5486400"/>
   <p:notesSz cx="6858000" cy="9144000"/>
@@ -154,7 +155,7 @@
           </a:lstStyle>
           <a:p>
             <a:r>
-              <a:rPr lang="en-US" smtClean="0"/>
+              <a:rPr lang="en-US"/>
               <a:t>Click to edit Master title style</a:t>
             </a:r>
             <a:endParaRPr lang="en-US" dirty="0"/>
@@ -219,7 +220,7 @@
           </a:lstStyle>
           <a:p>
             <a:r>
-              <a:rPr lang="en-US" smtClean="0"/>
+              <a:rPr lang="en-US"/>
               <a:t>Click to edit Master subtitle style</a:t>
             </a:r>
             <a:endParaRPr lang="en-US" dirty="0"/>
@@ -243,7 +244,7 @@
           <a:p>
             <a:fld id="{0934B269-34E5-4299-B825-817A141ADB8C}" type="datetimeFigureOut">
               <a:rPr lang="en-US" smtClean="0"/>
-              <a:t>9/17/2018</a:t>
+              <a:t>9/17/18</a:t>
             </a:fld>
             <a:endParaRPr lang="en-US"/>
           </a:p>
@@ -337,7 +338,7 @@
           <a:lstStyle/>
           <a:p>
             <a:r>
-              <a:rPr lang="en-US" smtClean="0"/>
+              <a:rPr lang="en-US"/>
               <a:t>Click to edit Master title style</a:t>
             </a:r>
             <a:endParaRPr lang="en-US" dirty="0"/>
@@ -361,35 +362,35 @@
           <a:p>
             <a:pPr lvl="0"/>
             <a:r>
-              <a:rPr lang="en-US" smtClean="0"/>
+              <a:rPr lang="en-US"/>
               <a:t>Edit Master text styles</a:t>
             </a:r>
           </a:p>
           <a:p>
             <a:pPr lvl="1"/>
             <a:r>
-              <a:rPr lang="en-US" smtClean="0"/>
+              <a:rPr lang="en-US"/>
               <a:t>Second level</a:t>
             </a:r>
           </a:p>
           <a:p>
             <a:pPr lvl="2"/>
             <a:r>
-              <a:rPr lang="en-US" smtClean="0"/>
+              <a:rPr lang="en-US"/>
               <a:t>Third level</a:t>
             </a:r>
           </a:p>
           <a:p>
             <a:pPr lvl="3"/>
             <a:r>
-              <a:rPr lang="en-US" smtClean="0"/>
+              <a:rPr lang="en-US"/>
               <a:t>Fourth level</a:t>
             </a:r>
           </a:p>
           <a:p>
             <a:pPr lvl="4"/>
             <a:r>
-              <a:rPr lang="en-US" smtClean="0"/>
+              <a:rPr lang="en-US"/>
               <a:t>Fifth level</a:t>
             </a:r>
             <a:endParaRPr lang="en-US" dirty="0"/>
@@ -413,7 +414,7 @@
           <a:p>
             <a:fld id="{0934B269-34E5-4299-B825-817A141ADB8C}" type="datetimeFigureOut">
               <a:rPr lang="en-US" smtClean="0"/>
-              <a:t>9/17/2018</a:t>
+              <a:t>9/17/18</a:t>
             </a:fld>
             <a:endParaRPr lang="en-US"/>
           </a:p>
@@ -512,7 +513,7 @@
           <a:lstStyle/>
           <a:p>
             <a:r>
-              <a:rPr lang="en-US" smtClean="0"/>
+              <a:rPr lang="en-US"/>
               <a:t>Click to edit Master title style</a:t>
             </a:r>
             <a:endParaRPr lang="en-US" dirty="0"/>
@@ -541,35 +542,35 @@
           <a:p>
             <a:pPr lvl="0"/>
             <a:r>
-              <a:rPr lang="en-US" smtClean="0"/>
+              <a:rPr lang="en-US"/>
               <a:t>Edit Master text styles</a:t>
             </a:r>
           </a:p>
           <a:p>
             <a:pPr lvl="1"/>
             <a:r>
-              <a:rPr lang="en-US" smtClean="0"/>
+              <a:rPr lang="en-US"/>
               <a:t>Second level</a:t>
             </a:r>
           </a:p>
           <a:p>
             <a:pPr lvl="2"/>
             <a:r>
-              <a:rPr lang="en-US" smtClean="0"/>
+              <a:rPr lang="en-US"/>
               <a:t>Third level</a:t>
             </a:r>
           </a:p>
           <a:p>
             <a:pPr lvl="3"/>
             <a:r>
-              <a:rPr lang="en-US" smtClean="0"/>
+              <a:rPr lang="en-US"/>
               <a:t>Fourth level</a:t>
             </a:r>
           </a:p>
           <a:p>
             <a:pPr lvl="4"/>
             <a:r>
-              <a:rPr lang="en-US" smtClean="0"/>
+              <a:rPr lang="en-US"/>
               <a:t>Fifth level</a:t>
             </a:r>
             <a:endParaRPr lang="en-US" dirty="0"/>
@@ -593,7 +594,7 @@
           <a:p>
             <a:fld id="{0934B269-34E5-4299-B825-817A141ADB8C}" type="datetimeFigureOut">
               <a:rPr lang="en-US" smtClean="0"/>
-              <a:t>9/17/2018</a:t>
+              <a:t>9/17/18</a:t>
             </a:fld>
             <a:endParaRPr lang="en-US"/>
           </a:p>
@@ -687,7 +688,7 @@
           <a:lstStyle/>
           <a:p>
             <a:r>
-              <a:rPr lang="en-US" smtClean="0"/>
+              <a:rPr lang="en-US"/>
               <a:t>Click to edit Master title style</a:t>
             </a:r>
             <a:endParaRPr lang="en-US" dirty="0"/>
@@ -711,35 +712,35 @@
           <a:p>
             <a:pPr lvl="0"/>
             <a:r>
-              <a:rPr lang="en-US" smtClean="0"/>
+              <a:rPr lang="en-US"/>
               <a:t>Edit Master text styles</a:t>
             </a:r>
           </a:p>
           <a:p>
             <a:pPr lvl="1"/>
             <a:r>
-              <a:rPr lang="en-US" smtClean="0"/>
+              <a:rPr lang="en-US"/>
               <a:t>Second level</a:t>
             </a:r>
           </a:p>
           <a:p>
             <a:pPr lvl="2"/>
             <a:r>
-              <a:rPr lang="en-US" smtClean="0"/>
+              <a:rPr lang="en-US"/>
               <a:t>Third level</a:t>
             </a:r>
           </a:p>
           <a:p>
             <a:pPr lvl="3"/>
             <a:r>
-              <a:rPr lang="en-US" smtClean="0"/>
+              <a:rPr lang="en-US"/>
               <a:t>Fourth level</a:t>
             </a:r>
           </a:p>
           <a:p>
             <a:pPr lvl="4"/>
             <a:r>
-              <a:rPr lang="en-US" smtClean="0"/>
+              <a:rPr lang="en-US"/>
               <a:t>Fifth level</a:t>
             </a:r>
             <a:endParaRPr lang="en-US" dirty="0"/>
@@ -763,7 +764,7 @@
           <a:p>
             <a:fld id="{0934B269-34E5-4299-B825-817A141ADB8C}" type="datetimeFigureOut">
               <a:rPr lang="en-US" smtClean="0"/>
-              <a:t>9/17/2018</a:t>
+              <a:t>9/17/18</a:t>
             </a:fld>
             <a:endParaRPr lang="en-US"/>
           </a:p>
@@ -866,7 +867,7 @@
           </a:lstStyle>
           <a:p>
             <a:r>
-              <a:rPr lang="en-US" smtClean="0"/>
+              <a:rPr lang="en-US"/>
               <a:t>Click to edit Master title style</a:t>
             </a:r>
             <a:endParaRPr lang="en-US" dirty="0"/>
@@ -986,7 +987,7 @@
           <a:p>
             <a:pPr lvl="0"/>
             <a:r>
-              <a:rPr lang="en-US" smtClean="0"/>
+              <a:rPr lang="en-US"/>
               <a:t>Edit Master text styles</a:t>
             </a:r>
           </a:p>
@@ -1009,7 +1010,7 @@
           <a:p>
             <a:fld id="{0934B269-34E5-4299-B825-817A141ADB8C}" type="datetimeFigureOut">
               <a:rPr lang="en-US" smtClean="0"/>
-              <a:t>9/17/2018</a:t>
+              <a:t>9/17/18</a:t>
             </a:fld>
             <a:endParaRPr lang="en-US"/>
           </a:p>
@@ -1103,7 +1104,7 @@
           <a:lstStyle/>
           <a:p>
             <a:r>
-              <a:rPr lang="en-US" smtClean="0"/>
+              <a:rPr lang="en-US"/>
               <a:t>Click to edit Master title style</a:t>
             </a:r>
             <a:endParaRPr lang="en-US" dirty="0"/>
@@ -1132,35 +1133,35 @@
           <a:p>
             <a:pPr lvl="0"/>
             <a:r>
-              <a:rPr lang="en-US" smtClean="0"/>
+              <a:rPr lang="en-US"/>
               <a:t>Edit Master text styles</a:t>
             </a:r>
           </a:p>
           <a:p>
             <a:pPr lvl="1"/>
             <a:r>
-              <a:rPr lang="en-US" smtClean="0"/>
+              <a:rPr lang="en-US"/>
               <a:t>Second level</a:t>
             </a:r>
           </a:p>
           <a:p>
             <a:pPr lvl="2"/>
             <a:r>
-              <a:rPr lang="en-US" smtClean="0"/>
+              <a:rPr lang="en-US"/>
               <a:t>Third level</a:t>
             </a:r>
           </a:p>
           <a:p>
             <a:pPr lvl="3"/>
             <a:r>
-              <a:rPr lang="en-US" smtClean="0"/>
+              <a:rPr lang="en-US"/>
               <a:t>Fourth level</a:t>
             </a:r>
           </a:p>
           <a:p>
             <a:pPr lvl="4"/>
             <a:r>
-              <a:rPr lang="en-US" smtClean="0"/>
+              <a:rPr lang="en-US"/>
               <a:t>Fifth level</a:t>
             </a:r>
             <a:endParaRPr lang="en-US" dirty="0"/>
@@ -1189,35 +1190,35 @@
           <a:p>
             <a:pPr lvl="0"/>
             <a:r>
-              <a:rPr lang="en-US" smtClean="0"/>
+              <a:rPr lang="en-US"/>
               <a:t>Edit Master text styles</a:t>
             </a:r>
           </a:p>
           <a:p>
             <a:pPr lvl="1"/>
             <a:r>
-              <a:rPr lang="en-US" smtClean="0"/>
+              <a:rPr lang="en-US"/>
               <a:t>Second level</a:t>
             </a:r>
           </a:p>
           <a:p>
             <a:pPr lvl="2"/>
             <a:r>
-              <a:rPr lang="en-US" smtClean="0"/>
+              <a:rPr lang="en-US"/>
               <a:t>Third level</a:t>
             </a:r>
           </a:p>
           <a:p>
             <a:pPr lvl="3"/>
             <a:r>
-              <a:rPr lang="en-US" smtClean="0"/>
+              <a:rPr lang="en-US"/>
               <a:t>Fourth level</a:t>
             </a:r>
           </a:p>
           <a:p>
             <a:pPr lvl="4"/>
             <a:r>
-              <a:rPr lang="en-US" smtClean="0"/>
+              <a:rPr lang="en-US"/>
               <a:t>Fifth level</a:t>
             </a:r>
             <a:endParaRPr lang="en-US" dirty="0"/>
@@ -1241,7 +1242,7 @@
           <a:p>
             <a:fld id="{0934B269-34E5-4299-B825-817A141ADB8C}" type="datetimeFigureOut">
               <a:rPr lang="en-US" smtClean="0"/>
-              <a:t>9/17/2018</a:t>
+              <a:t>9/17/18</a:t>
             </a:fld>
             <a:endParaRPr lang="en-US"/>
           </a:p>
@@ -1340,7 +1341,7 @@
           <a:lstStyle/>
           <a:p>
             <a:r>
-              <a:rPr lang="en-US" smtClean="0"/>
+              <a:rPr lang="en-US"/>
               <a:t>Click to edit Master title style</a:t>
             </a:r>
             <a:endParaRPr lang="en-US" dirty="0"/>
@@ -1406,7 +1407,7 @@
           <a:p>
             <a:pPr lvl="0"/>
             <a:r>
-              <a:rPr lang="en-US" smtClean="0"/>
+              <a:rPr lang="en-US"/>
               <a:t>Edit Master text styles</a:t>
             </a:r>
           </a:p>
@@ -1434,35 +1435,35 @@
           <a:p>
             <a:pPr lvl="0"/>
             <a:r>
-              <a:rPr lang="en-US" smtClean="0"/>
+              <a:rPr lang="en-US"/>
               <a:t>Edit Master text styles</a:t>
             </a:r>
           </a:p>
           <a:p>
             <a:pPr lvl="1"/>
             <a:r>
-              <a:rPr lang="en-US" smtClean="0"/>
+              <a:rPr lang="en-US"/>
               <a:t>Second level</a:t>
             </a:r>
           </a:p>
           <a:p>
             <a:pPr lvl="2"/>
             <a:r>
-              <a:rPr lang="en-US" smtClean="0"/>
+              <a:rPr lang="en-US"/>
               <a:t>Third level</a:t>
             </a:r>
           </a:p>
           <a:p>
             <a:pPr lvl="3"/>
             <a:r>
-              <a:rPr lang="en-US" smtClean="0"/>
+              <a:rPr lang="en-US"/>
               <a:t>Fourth level</a:t>
             </a:r>
           </a:p>
           <a:p>
             <a:pPr lvl="4"/>
             <a:r>
-              <a:rPr lang="en-US" smtClean="0"/>
+              <a:rPr lang="en-US"/>
               <a:t>Fifth level</a:t>
             </a:r>
             <a:endParaRPr lang="en-US" dirty="0"/>
@@ -1528,7 +1529,7 @@
           <a:p>
             <a:pPr lvl="0"/>
             <a:r>
-              <a:rPr lang="en-US" smtClean="0"/>
+              <a:rPr lang="en-US"/>
               <a:t>Edit Master text styles</a:t>
             </a:r>
           </a:p>
@@ -1556,35 +1557,35 @@
           <a:p>
             <a:pPr lvl="0"/>
             <a:r>
-              <a:rPr lang="en-US" smtClean="0"/>
+              <a:rPr lang="en-US"/>
               <a:t>Edit Master text styles</a:t>
             </a:r>
           </a:p>
           <a:p>
             <a:pPr lvl="1"/>
             <a:r>
-              <a:rPr lang="en-US" smtClean="0"/>
+              <a:rPr lang="en-US"/>
               <a:t>Second level</a:t>
             </a:r>
           </a:p>
           <a:p>
             <a:pPr lvl="2"/>
             <a:r>
-              <a:rPr lang="en-US" smtClean="0"/>
+              <a:rPr lang="en-US"/>
               <a:t>Third level</a:t>
             </a:r>
           </a:p>
           <a:p>
             <a:pPr lvl="3"/>
             <a:r>
-              <a:rPr lang="en-US" smtClean="0"/>
+              <a:rPr lang="en-US"/>
               <a:t>Fourth level</a:t>
             </a:r>
           </a:p>
           <a:p>
             <a:pPr lvl="4"/>
             <a:r>
-              <a:rPr lang="en-US" smtClean="0"/>
+              <a:rPr lang="en-US"/>
               <a:t>Fifth level</a:t>
             </a:r>
             <a:endParaRPr lang="en-US" dirty="0"/>
@@ -1608,7 +1609,7 @@
           <a:p>
             <a:fld id="{0934B269-34E5-4299-B825-817A141ADB8C}" type="datetimeFigureOut">
               <a:rPr lang="en-US" smtClean="0"/>
-              <a:t>9/17/2018</a:t>
+              <a:t>9/17/18</a:t>
             </a:fld>
             <a:endParaRPr lang="en-US"/>
           </a:p>
@@ -1702,7 +1703,7 @@
           <a:lstStyle/>
           <a:p>
             <a:r>
-              <a:rPr lang="en-US" smtClean="0"/>
+              <a:rPr lang="en-US"/>
               <a:t>Click to edit Master title style</a:t>
             </a:r>
             <a:endParaRPr lang="en-US" dirty="0"/>
@@ -1726,7 +1727,7 @@
           <a:p>
             <a:fld id="{0934B269-34E5-4299-B825-817A141ADB8C}" type="datetimeFigureOut">
               <a:rPr lang="en-US" smtClean="0"/>
-              <a:t>9/17/2018</a:t>
+              <a:t>9/17/18</a:t>
             </a:fld>
             <a:endParaRPr lang="en-US"/>
           </a:p>
@@ -1821,7 +1822,7 @@
           <a:p>
             <a:fld id="{0934B269-34E5-4299-B825-817A141ADB8C}" type="datetimeFigureOut">
               <a:rPr lang="en-US" smtClean="0"/>
-              <a:t>9/17/2018</a:t>
+              <a:t>9/17/18</a:t>
             </a:fld>
             <a:endParaRPr lang="en-US"/>
           </a:p>
@@ -1924,7 +1925,7 @@
           </a:lstStyle>
           <a:p>
             <a:r>
-              <a:rPr lang="en-US" smtClean="0"/>
+              <a:rPr lang="en-US"/>
               <a:t>Click to edit Master title style</a:t>
             </a:r>
             <a:endParaRPr lang="en-US" dirty="0"/>
@@ -1981,35 +1982,35 @@
           <a:p>
             <a:pPr lvl="0"/>
             <a:r>
-              <a:rPr lang="en-US" smtClean="0"/>
+              <a:rPr lang="en-US"/>
               <a:t>Edit Master text styles</a:t>
             </a:r>
           </a:p>
           <a:p>
             <a:pPr lvl="1"/>
             <a:r>
-              <a:rPr lang="en-US" smtClean="0"/>
+              <a:rPr lang="en-US"/>
               <a:t>Second level</a:t>
             </a:r>
           </a:p>
           <a:p>
             <a:pPr lvl="2"/>
             <a:r>
-              <a:rPr lang="en-US" smtClean="0"/>
+              <a:rPr lang="en-US"/>
               <a:t>Third level</a:t>
             </a:r>
           </a:p>
           <a:p>
             <a:pPr lvl="3"/>
             <a:r>
-              <a:rPr lang="en-US" smtClean="0"/>
+              <a:rPr lang="en-US"/>
               <a:t>Fourth level</a:t>
             </a:r>
           </a:p>
           <a:p>
             <a:pPr lvl="4"/>
             <a:r>
-              <a:rPr lang="en-US" smtClean="0"/>
+              <a:rPr lang="en-US"/>
               <a:t>Fifth level</a:t>
             </a:r>
             <a:endParaRPr lang="en-US" dirty="0"/>
@@ -2075,7 +2076,7 @@
           <a:p>
             <a:pPr lvl="0"/>
             <a:r>
-              <a:rPr lang="en-US" smtClean="0"/>
+              <a:rPr lang="en-US"/>
               <a:t>Edit Master text styles</a:t>
             </a:r>
           </a:p>
@@ -2098,7 +2099,7 @@
           <a:p>
             <a:fld id="{0934B269-34E5-4299-B825-817A141ADB8C}" type="datetimeFigureOut">
               <a:rPr lang="en-US" smtClean="0"/>
-              <a:t>9/17/2018</a:t>
+              <a:t>9/17/18</a:t>
             </a:fld>
             <a:endParaRPr lang="en-US"/>
           </a:p>
@@ -2201,7 +2202,7 @@
           </a:lstStyle>
           <a:p>
             <a:r>
-              <a:rPr lang="en-US" smtClean="0"/>
+              <a:rPr lang="en-US"/>
               <a:t>Click to edit Master title style</a:t>
             </a:r>
             <a:endParaRPr lang="en-US" dirty="0"/>
@@ -2266,7 +2267,7 @@
           </a:lstStyle>
           <a:p>
             <a:r>
-              <a:rPr lang="en-US" smtClean="0"/>
+              <a:rPr lang="en-US"/>
               <a:t>Click icon to add picture</a:t>
             </a:r>
             <a:endParaRPr lang="en-US" dirty="0"/>
@@ -2332,7 +2333,7 @@
           <a:p>
             <a:pPr lvl="0"/>
             <a:r>
-              <a:rPr lang="en-US" smtClean="0"/>
+              <a:rPr lang="en-US"/>
               <a:t>Edit Master text styles</a:t>
             </a:r>
           </a:p>
@@ -2355,7 +2356,7 @@
           <a:p>
             <a:fld id="{0934B269-34E5-4299-B825-817A141ADB8C}" type="datetimeFigureOut">
               <a:rPr lang="en-US" smtClean="0"/>
-              <a:t>9/17/2018</a:t>
+              <a:t>9/17/18</a:t>
             </a:fld>
             <a:endParaRPr lang="en-US"/>
           </a:p>
@@ -2464,7 +2465,7 @@
           <a:lstStyle/>
           <a:p>
             <a:r>
-              <a:rPr lang="en-US" smtClean="0"/>
+              <a:rPr lang="en-US"/>
               <a:t>Click to edit Master title style</a:t>
             </a:r>
             <a:endParaRPr lang="en-US" dirty="0"/>
@@ -2498,35 +2499,35 @@
           <a:p>
             <a:pPr lvl="0"/>
             <a:r>
-              <a:rPr lang="en-US" smtClean="0"/>
+              <a:rPr lang="en-US"/>
               <a:t>Edit Master text styles</a:t>
             </a:r>
           </a:p>
           <a:p>
             <a:pPr lvl="1"/>
             <a:r>
-              <a:rPr lang="en-US" smtClean="0"/>
+              <a:rPr lang="en-US"/>
               <a:t>Second level</a:t>
             </a:r>
           </a:p>
           <a:p>
             <a:pPr lvl="2"/>
             <a:r>
-              <a:rPr lang="en-US" smtClean="0"/>
+              <a:rPr lang="en-US"/>
               <a:t>Third level</a:t>
             </a:r>
           </a:p>
           <a:p>
             <a:pPr lvl="3"/>
             <a:r>
-              <a:rPr lang="en-US" smtClean="0"/>
+              <a:rPr lang="en-US"/>
               <a:t>Fourth level</a:t>
             </a:r>
           </a:p>
           <a:p>
             <a:pPr lvl="4"/>
             <a:r>
-              <a:rPr lang="en-US" smtClean="0"/>
+              <a:rPr lang="en-US"/>
               <a:t>Fifth level</a:t>
             </a:r>
             <a:endParaRPr lang="en-US" dirty="0"/>
@@ -2568,7 +2569,7 @@
           <a:p>
             <a:fld id="{0934B269-34E5-4299-B825-817A141ADB8C}" type="datetimeFigureOut">
               <a:rPr lang="en-US" smtClean="0"/>
-              <a:t>9/17/2018</a:t>
+              <a:t>9/17/18</a:t>
             </a:fld>
             <a:endParaRPr lang="en-US"/>
           </a:p>
@@ -3283,6 +3284,410 @@
 </p:sld>
 </file>
 
+<file path=ppt/slides/slide2.xml><?xml version="1.0" encoding="utf-8"?>
+<p:sld xmlns:a="http://schemas.openxmlformats.org/drawingml/2006/main" xmlns:r="http://schemas.openxmlformats.org/officeDocument/2006/relationships" xmlns:p="http://schemas.openxmlformats.org/presentationml/2006/main">
+  <p:cSld>
+    <p:spTree>
+      <p:nvGrpSpPr>
+        <p:cNvPr id="1" name=""/>
+        <p:cNvGrpSpPr/>
+        <p:nvPr/>
+      </p:nvGrpSpPr>
+      <p:grpSpPr>
+        <a:xfrm>
+          <a:off x="0" y="0"/>
+          <a:ext cx="0" cy="0"/>
+          <a:chOff x="0" y="0"/>
+          <a:chExt cx="0" cy="0"/>
+        </a:xfrm>
+      </p:grpSpPr>
+      <p:pic>
+        <p:nvPicPr>
+          <p:cNvPr id="2" name="Picture 1">
+            <a:extLst>
+              <a:ext uri="{FF2B5EF4-FFF2-40B4-BE49-F238E27FC236}">
+                <a16:creationId xmlns:a16="http://schemas.microsoft.com/office/drawing/2014/main" id="{71AA2765-5CCD-0045-A113-DAE3D61F9A0C}"/>
+              </a:ext>
+            </a:extLst>
+          </p:cNvPr>
+          <p:cNvPicPr>
+            <a:picLocks noChangeAspect="1"/>
+          </p:cNvPicPr>
+          <p:nvPr/>
+        </p:nvPicPr>
+        <p:blipFill>
+          <a:blip r:embed="rId2"/>
+          <a:stretch>
+            <a:fillRect/>
+          </a:stretch>
+        </p:blipFill>
+        <p:spPr>
+          <a:xfrm>
+            <a:off x="0" y="0"/>
+            <a:ext cx="8800353" cy="5280212"/>
+          </a:xfrm>
+          <a:prstGeom prst="rect">
+            <a:avLst/>
+          </a:prstGeom>
+        </p:spPr>
+      </p:pic>
+      <p:pic>
+        <p:nvPicPr>
+          <p:cNvPr id="3" name="Picture 2">
+            <a:extLst>
+              <a:ext uri="{FF2B5EF4-FFF2-40B4-BE49-F238E27FC236}">
+                <a16:creationId xmlns:a16="http://schemas.microsoft.com/office/drawing/2014/main" id="{BBC1FFD6-BA0F-3D45-9B87-4BF2489ABA72}"/>
+              </a:ext>
+            </a:extLst>
+          </p:cNvPr>
+          <p:cNvPicPr>
+            <a:picLocks noChangeAspect="1"/>
+          </p:cNvPicPr>
+          <p:nvPr/>
+        </p:nvPicPr>
+        <p:blipFill rotWithShape="1">
+          <a:blip r:embed="rId3"/>
+          <a:srcRect r="-1765" b="701"/>
+          <a:stretch/>
+        </p:blipFill>
+        <p:spPr>
+          <a:xfrm>
+            <a:off x="8541813" y="779929"/>
+            <a:ext cx="517080" cy="4007224"/>
+          </a:xfrm>
+          <a:prstGeom prst="rect">
+            <a:avLst/>
+          </a:prstGeom>
+        </p:spPr>
+      </p:pic>
+      <p:pic>
+        <p:nvPicPr>
+          <p:cNvPr id="4" name="Picture 3">
+            <a:extLst>
+              <a:ext uri="{FF2B5EF4-FFF2-40B4-BE49-F238E27FC236}">
+                <a16:creationId xmlns:a16="http://schemas.microsoft.com/office/drawing/2014/main" id="{06A70EBB-7F01-2746-AFC2-4951F15AF830}"/>
+              </a:ext>
+            </a:extLst>
+          </p:cNvPr>
+          <p:cNvPicPr>
+            <a:picLocks noChangeAspect="1"/>
+          </p:cNvPicPr>
+          <p:nvPr/>
+        </p:nvPicPr>
+        <p:blipFill rotWithShape="1">
+          <a:blip r:embed="rId4">
+            <a:extLst>
+              <a:ext uri="{28A0092B-C50C-407E-A947-70E740481C1C}">
+                <a14:useLocalDpi xmlns:a14="http://schemas.microsoft.com/office/drawing/2010/main" val="0"/>
+              </a:ext>
+            </a:extLst>
+          </a:blip>
+          <a:srcRect l="92604" t="92284" r="1611" b="1655"/>
+          <a:stretch/>
+        </p:blipFill>
+        <p:spPr>
+          <a:xfrm>
+            <a:off x="1360000" y="1680345"/>
+            <a:ext cx="722715" cy="370155"/>
+          </a:xfrm>
+          <a:prstGeom prst="rect">
+            <a:avLst/>
+          </a:prstGeom>
+        </p:spPr>
+      </p:pic>
+      <p:cxnSp>
+        <p:nvCxnSpPr>
+          <p:cNvPr id="5" name="Straight Arrow Connector 4">
+            <a:extLst>
+              <a:ext uri="{FF2B5EF4-FFF2-40B4-BE49-F238E27FC236}">
+                <a16:creationId xmlns:a16="http://schemas.microsoft.com/office/drawing/2014/main" id="{F939157B-5338-5A47-A504-21A0A773330F}"/>
+              </a:ext>
+            </a:extLst>
+          </p:cNvPr>
+          <p:cNvCxnSpPr/>
+          <p:nvPr/>
+        </p:nvCxnSpPr>
+        <p:spPr>
+          <a:xfrm flipH="1">
+            <a:off x="1009710" y="2050500"/>
+            <a:ext cx="711648" cy="346839"/>
+          </a:xfrm>
+          <a:prstGeom prst="straightConnector1">
+            <a:avLst/>
+          </a:prstGeom>
+          <a:ln w="12700">
+            <a:solidFill>
+              <a:schemeClr val="tx1"/>
+            </a:solidFill>
+            <a:tailEnd type="triangle"/>
+          </a:ln>
+        </p:spPr>
+        <p:style>
+          <a:lnRef idx="1">
+            <a:schemeClr val="accent1"/>
+          </a:lnRef>
+          <a:fillRef idx="0">
+            <a:schemeClr val="accent1"/>
+          </a:fillRef>
+          <a:effectRef idx="0">
+            <a:schemeClr val="accent1"/>
+          </a:effectRef>
+          <a:fontRef idx="minor">
+            <a:schemeClr val="tx1"/>
+          </a:fontRef>
+        </p:style>
+      </p:cxnSp>
+      <p:cxnSp>
+        <p:nvCxnSpPr>
+          <p:cNvPr id="6" name="Straight Arrow Connector 5">
+            <a:extLst>
+              <a:ext uri="{FF2B5EF4-FFF2-40B4-BE49-F238E27FC236}">
+                <a16:creationId xmlns:a16="http://schemas.microsoft.com/office/drawing/2014/main" id="{7F6EA2B4-938B-FA4A-BA52-A8514D92D139}"/>
+              </a:ext>
+            </a:extLst>
+          </p:cNvPr>
+          <p:cNvCxnSpPr/>
+          <p:nvPr/>
+        </p:nvCxnSpPr>
+        <p:spPr>
+          <a:xfrm flipH="1">
+            <a:off x="1577041" y="2039001"/>
+            <a:ext cx="152400" cy="593649"/>
+          </a:xfrm>
+          <a:prstGeom prst="straightConnector1">
+            <a:avLst/>
+          </a:prstGeom>
+          <a:ln w="12700">
+            <a:solidFill>
+              <a:schemeClr val="tx1"/>
+            </a:solidFill>
+            <a:tailEnd type="triangle"/>
+          </a:ln>
+        </p:spPr>
+        <p:style>
+          <a:lnRef idx="1">
+            <a:schemeClr val="accent1"/>
+          </a:lnRef>
+          <a:fillRef idx="0">
+            <a:schemeClr val="accent1"/>
+          </a:fillRef>
+          <a:effectRef idx="0">
+            <a:schemeClr val="accent1"/>
+          </a:effectRef>
+          <a:fontRef idx="minor">
+            <a:schemeClr val="tx1"/>
+          </a:fontRef>
+        </p:style>
+      </p:cxnSp>
+      <p:pic>
+        <p:nvPicPr>
+          <p:cNvPr id="7" name="Picture 6">
+            <a:extLst>
+              <a:ext uri="{FF2B5EF4-FFF2-40B4-BE49-F238E27FC236}">
+                <a16:creationId xmlns:a16="http://schemas.microsoft.com/office/drawing/2014/main" id="{7BE3DAC9-550E-6245-B7E3-BD6E5F6C497D}"/>
+              </a:ext>
+            </a:extLst>
+          </p:cNvPr>
+          <p:cNvPicPr>
+            <a:picLocks noChangeAspect="1"/>
+          </p:cNvPicPr>
+          <p:nvPr/>
+        </p:nvPicPr>
+        <p:blipFill rotWithShape="1">
+          <a:blip r:embed="rId4">
+            <a:extLst>
+              <a:ext uri="{28A0092B-C50C-407E-A947-70E740481C1C}">
+                <a14:useLocalDpi xmlns:a14="http://schemas.microsoft.com/office/drawing/2010/main" val="0"/>
+              </a:ext>
+            </a:extLst>
+          </a:blip>
+          <a:srcRect l="69674" t="56699" r="24464" b="31075"/>
+          <a:stretch/>
+        </p:blipFill>
+        <p:spPr>
+          <a:xfrm>
+            <a:off x="2731068" y="2236334"/>
+            <a:ext cx="703808" cy="717445"/>
+          </a:xfrm>
+          <a:prstGeom prst="rect">
+            <a:avLst/>
+          </a:prstGeom>
+        </p:spPr>
+      </p:pic>
+      <p:cxnSp>
+        <p:nvCxnSpPr>
+          <p:cNvPr id="8" name="Straight Arrow Connector 7">
+            <a:extLst>
+              <a:ext uri="{FF2B5EF4-FFF2-40B4-BE49-F238E27FC236}">
+                <a16:creationId xmlns:a16="http://schemas.microsoft.com/office/drawing/2014/main" id="{675F4AB7-89F3-7E46-B1B1-9BEC3C0685CA}"/>
+              </a:ext>
+            </a:extLst>
+          </p:cNvPr>
+          <p:cNvCxnSpPr/>
+          <p:nvPr/>
+        </p:nvCxnSpPr>
+        <p:spPr>
+          <a:xfrm flipH="1">
+            <a:off x="2978718" y="2841751"/>
+            <a:ext cx="50800" cy="224056"/>
+          </a:xfrm>
+          <a:prstGeom prst="straightConnector1">
+            <a:avLst/>
+          </a:prstGeom>
+          <a:ln w="12700">
+            <a:solidFill>
+              <a:schemeClr val="tx1"/>
+            </a:solidFill>
+            <a:tailEnd type="triangle"/>
+          </a:ln>
+        </p:spPr>
+        <p:style>
+          <a:lnRef idx="1">
+            <a:schemeClr val="accent1"/>
+          </a:lnRef>
+          <a:fillRef idx="0">
+            <a:schemeClr val="accent1"/>
+          </a:fillRef>
+          <a:effectRef idx="0">
+            <a:schemeClr val="accent1"/>
+          </a:effectRef>
+          <a:fontRef idx="minor">
+            <a:schemeClr val="tx1"/>
+          </a:fontRef>
+        </p:style>
+      </p:cxnSp>
+      <p:pic>
+        <p:nvPicPr>
+          <p:cNvPr id="9" name="Picture 8">
+            <a:extLst>
+              <a:ext uri="{FF2B5EF4-FFF2-40B4-BE49-F238E27FC236}">
+                <a16:creationId xmlns:a16="http://schemas.microsoft.com/office/drawing/2014/main" id="{1A28AEC4-0B34-8745-9CE2-DE7582C1A1D0}"/>
+              </a:ext>
+            </a:extLst>
+          </p:cNvPr>
+          <p:cNvPicPr>
+            <a:picLocks noChangeAspect="1"/>
+          </p:cNvPicPr>
+          <p:nvPr/>
+        </p:nvPicPr>
+        <p:blipFill rotWithShape="1">
+          <a:blip r:embed="rId4">
+            <a:extLst>
+              <a:ext uri="{28A0092B-C50C-407E-A947-70E740481C1C}">
+                <a14:useLocalDpi xmlns:a14="http://schemas.microsoft.com/office/drawing/2010/main" val="0"/>
+              </a:ext>
+            </a:extLst>
+          </a:blip>
+          <a:srcRect l="13516" t="85381" r="81354"/>
+          <a:stretch/>
+        </p:blipFill>
+        <p:spPr>
+          <a:xfrm>
+            <a:off x="732150" y="3529849"/>
+            <a:ext cx="626838" cy="873295"/>
+          </a:xfrm>
+          <a:prstGeom prst="rect">
+            <a:avLst/>
+          </a:prstGeom>
+        </p:spPr>
+      </p:pic>
+      <p:cxnSp>
+        <p:nvCxnSpPr>
+          <p:cNvPr id="10" name="Straight Arrow Connector 9">
+            <a:extLst>
+              <a:ext uri="{FF2B5EF4-FFF2-40B4-BE49-F238E27FC236}">
+                <a16:creationId xmlns:a16="http://schemas.microsoft.com/office/drawing/2014/main" id="{62CBC8D4-8B55-5745-AF74-45C38B6AE767}"/>
+              </a:ext>
+            </a:extLst>
+          </p:cNvPr>
+          <p:cNvCxnSpPr/>
+          <p:nvPr/>
+        </p:nvCxnSpPr>
+        <p:spPr>
+          <a:xfrm flipV="1">
+            <a:off x="1193800" y="3631450"/>
+            <a:ext cx="571500" cy="381001"/>
+          </a:xfrm>
+          <a:prstGeom prst="straightConnector1">
+            <a:avLst/>
+          </a:prstGeom>
+          <a:ln w="12700">
+            <a:solidFill>
+              <a:schemeClr val="tx1"/>
+            </a:solidFill>
+            <a:tailEnd type="triangle"/>
+          </a:ln>
+        </p:spPr>
+        <p:style>
+          <a:lnRef idx="1">
+            <a:schemeClr val="accent1"/>
+          </a:lnRef>
+          <a:fillRef idx="0">
+            <a:schemeClr val="accent1"/>
+          </a:fillRef>
+          <a:effectRef idx="0">
+            <a:schemeClr val="accent1"/>
+          </a:effectRef>
+          <a:fontRef idx="minor">
+            <a:schemeClr val="tx1"/>
+          </a:fontRef>
+        </p:style>
+      </p:cxnSp>
+      <p:cxnSp>
+        <p:nvCxnSpPr>
+          <p:cNvPr id="11" name="Straight Arrow Connector 10">
+            <a:extLst>
+              <a:ext uri="{FF2B5EF4-FFF2-40B4-BE49-F238E27FC236}">
+                <a16:creationId xmlns:a16="http://schemas.microsoft.com/office/drawing/2014/main" id="{EEEEA0FB-6350-9E4E-8267-94004DE239EB}"/>
+              </a:ext>
+            </a:extLst>
+          </p:cNvPr>
+          <p:cNvCxnSpPr/>
+          <p:nvPr/>
+        </p:nvCxnSpPr>
+        <p:spPr>
+          <a:xfrm flipV="1">
+            <a:off x="1184912" y="3186950"/>
+            <a:ext cx="353219" cy="837601"/>
+          </a:xfrm>
+          <a:prstGeom prst="straightConnector1">
+            <a:avLst/>
+          </a:prstGeom>
+          <a:ln w="12700">
+            <a:solidFill>
+              <a:schemeClr val="tx1"/>
+            </a:solidFill>
+            <a:tailEnd type="triangle"/>
+          </a:ln>
+        </p:spPr>
+        <p:style>
+          <a:lnRef idx="1">
+            <a:schemeClr val="accent1"/>
+          </a:lnRef>
+          <a:fillRef idx="0">
+            <a:schemeClr val="accent1"/>
+          </a:fillRef>
+          <a:effectRef idx="0">
+            <a:schemeClr val="accent1"/>
+          </a:effectRef>
+          <a:fontRef idx="minor">
+            <a:schemeClr val="tx1"/>
+          </a:fontRef>
+        </p:style>
+      </p:cxnSp>
+    </p:spTree>
+    <p:extLst>
+      <p:ext uri="{BB962C8B-B14F-4D97-AF65-F5344CB8AC3E}">
+        <p14:creationId xmlns:p14="http://schemas.microsoft.com/office/powerpoint/2010/main" val="3507617507"/>
+      </p:ext>
+    </p:extLst>
+  </p:cSld>
+  <p:clrMapOvr>
+    <a:masterClrMapping/>
+  </p:clrMapOvr>
+</p:sld>
+</file>
+
 <file path=ppt/theme/theme1.xml><?xml version="1.0" encoding="utf-8"?>
 <a:theme xmlns:a="http://schemas.openxmlformats.org/drawingml/2006/main" name="Office Theme">
   <a:themeElements>

</xml_diff>